<commit_message>
Se quita un label de struct incorrecto en una diapositiva
</commit_message>
<xml_diff>
--- a/Presentaciones/Introduccion .NET.pptx
+++ b/Presentaciones/Introduccion .NET.pptx
@@ -267,7 +267,7 @@
           <a:p>
             <a:fld id="{9CF9B008-76FC-4A89-86AF-A3CFDD2ADA03}" type="datetimeFigureOut">
               <a:rPr lang="en-US" smtClean="0"/>
-              <a:t>3/29/2016</a:t>
+              <a:t>4/11/2017</a:t>
             </a:fld>
             <a:endParaRPr lang="en-US"/>
           </a:p>
@@ -18897,8 +18897,8 @@
           <a:chExt cx="0" cy="0"/>
         </a:xfrm>
       </p:grpSpPr>
-      <mc:AlternateContent xmlns:mc="http://schemas.openxmlformats.org/markup-compatibility/2006">
-        <mc:Choice xmlns:a14="http://schemas.microsoft.com/office/drawing/2010/main" Requires="a14">
+      <mc:AlternateContent xmlns:mc="http://schemas.openxmlformats.org/markup-compatibility/2006" xmlns:a14="http://schemas.microsoft.com/office/drawing/2010/main">
+        <mc:Choice Requires="a14">
           <p:sp>
             <p:nvSpPr>
               <p:cNvPr id="2" name="Content Placeholder 1"/>
@@ -19250,7 +19250,7 @@
             </p:txBody>
           </p:sp>
         </mc:Choice>
-        <mc:Fallback>
+        <mc:Fallback xmlns="">
           <p:sp>
             <p:nvSpPr>
               <p:cNvPr id="2" name="Content Placeholder 1"/>
@@ -19682,35 +19682,6 @@
           </a:extLst>
         </p:spPr>
       </p:pic>
-      <p:sp>
-        <p:nvSpPr>
-          <p:cNvPr id="6" name="Rectangle 5"/>
-          <p:cNvSpPr/>
-          <p:nvPr/>
-        </p:nvSpPr>
-        <p:spPr>
-          <a:xfrm>
-            <a:off x="5659534" y="3244334"/>
-            <a:ext cx="872931" cy="369332"/>
-          </a:xfrm>
-          <a:prstGeom prst="rect">
-            <a:avLst/>
-          </a:prstGeom>
-        </p:spPr>
-        <p:txBody>
-          <a:bodyPr wrap="none">
-            <a:spAutoFit/>
-          </a:bodyPr>
-          <a:lstStyle/>
-          <a:p>
-            <a:r>
-              <a:rPr lang="en-US" dirty="0" err="1"/>
-              <a:t>Structs</a:t>
-            </a:r>
-            <a:endParaRPr lang="en-US" dirty="0"/>
-          </a:p>
-        </p:txBody>
-      </p:sp>
     </p:spTree>
     <p:extLst>
       <p:ext uri="{BB962C8B-B14F-4D97-AF65-F5344CB8AC3E}">

</xml_diff>